<commit_message>
fin de la presentacion, dispuesto para entrega
</commit_message>
<xml_diff>
--- a/Criptografía taller práctico.pptx
+++ b/Criptografía taller práctico.pptx
@@ -283,7 +283,7 @@
           <a:p>
             <a:fld id="{D1D1EADE-8E88-4C7C-8AC5-FB148DE4940E}" type="datetime1">
               <a:rPr lang="en-US" smtClean="0"/>
-              <a:t>11/9/2025</a:t>
+              <a:t>11/10/2025</a:t>
             </a:fld>
             <a:endParaRPr lang="en-US"/>
           </a:p>
@@ -483,7 +483,7 @@
           <a:p>
             <a:fld id="{EC3C8B9C-477D-492A-96AD-1FC2CC997A73}" type="datetime1">
               <a:rPr lang="en-US" smtClean="0"/>
-              <a:t>11/9/2025</a:t>
+              <a:t>11/10/2025</a:t>
             </a:fld>
             <a:endParaRPr lang="en-US"/>
           </a:p>
@@ -693,7 +693,7 @@
           <a:p>
             <a:fld id="{42D3AED5-E26D-4E29-B1B3-7847B6779594}" type="datetime1">
               <a:rPr lang="en-US" smtClean="0"/>
-              <a:t>11/9/2025</a:t>
+              <a:t>11/10/2025</a:t>
             </a:fld>
             <a:endParaRPr lang="en-US"/>
           </a:p>
@@ -893,7 +893,7 @@
           <a:p>
             <a:fld id="{157B6794-849E-4626-908B-D15793550EFB}" type="datetime1">
               <a:rPr lang="en-US" smtClean="0"/>
-              <a:t>11/9/2025</a:t>
+              <a:t>11/10/2025</a:t>
             </a:fld>
             <a:endParaRPr lang="en-US"/>
           </a:p>
@@ -1169,7 +1169,7 @@
           <a:p>
             <a:fld id="{63DB64E7-5594-42A3-ADBF-E95A7ACEAD64}" type="datetime1">
               <a:rPr lang="en-US" smtClean="0"/>
-              <a:t>11/9/2025</a:t>
+              <a:t>11/10/2025</a:t>
             </a:fld>
             <a:endParaRPr lang="en-US"/>
           </a:p>
@@ -1442,7 +1442,7 @@
           <a:p>
             <a:fld id="{18462B0B-D248-4FFB-8695-AD7FA4B1284A}" type="datetime1">
               <a:rPr lang="en-US" smtClean="0"/>
-              <a:t>11/9/2025</a:t>
+              <a:t>11/10/2025</a:t>
             </a:fld>
             <a:endParaRPr lang="en-US"/>
           </a:p>
@@ -1865,7 +1865,7 @@
           <a:p>
             <a:fld id="{D0378EFB-9159-4510-B73F-4F0409ADE937}" type="datetime1">
               <a:rPr lang="en-US" smtClean="0"/>
-              <a:t>11/9/2025</a:t>
+              <a:t>11/10/2025</a:t>
             </a:fld>
             <a:endParaRPr lang="en-US"/>
           </a:p>
@@ -2007,7 +2007,7 @@
           <a:p>
             <a:fld id="{89BC9412-2452-4BED-A324-9D8C115361AD}" type="datetime1">
               <a:rPr lang="en-US" smtClean="0"/>
-              <a:t>11/9/2025</a:t>
+              <a:t>11/10/2025</a:t>
             </a:fld>
             <a:endParaRPr lang="en-US"/>
           </a:p>
@@ -2120,7 +2120,7 @@
           <a:p>
             <a:fld id="{F5318F62-D251-40E8-A23C-F4CFE9FEAB41}" type="datetime1">
               <a:rPr lang="en-US" smtClean="0"/>
-              <a:t>11/9/2025</a:t>
+              <a:t>11/10/2025</a:t>
             </a:fld>
             <a:endParaRPr lang="en-US"/>
           </a:p>
@@ -2433,7 +2433,7 @@
           <a:p>
             <a:fld id="{44F76144-149E-4874-93A5-554A0357CF82}" type="datetime1">
               <a:rPr lang="en-US" smtClean="0"/>
-              <a:t>11/9/2025</a:t>
+              <a:t>11/10/2025</a:t>
             </a:fld>
             <a:endParaRPr lang="en-US"/>
           </a:p>
@@ -2726,7 +2726,7 @@
           <a:p>
             <a:fld id="{50BA65D8-0540-4835-AE5C-25D29DBA01BE}" type="datetime1">
               <a:rPr lang="en-US" smtClean="0"/>
-              <a:t>11/9/2025</a:t>
+              <a:t>11/10/2025</a:t>
             </a:fld>
             <a:endParaRPr lang="en-US"/>
           </a:p>
@@ -2968,7 +2968,7 @@
           <a:p>
             <a:fld id="{E31BA835-12AC-4E8F-955A-EA3F4DE2791F}" type="datetime1">
               <a:rPr lang="en-US" smtClean="0"/>
-              <a:t>11/9/2025</a:t>
+              <a:t>11/10/2025</a:t>
             </a:fld>
             <a:endParaRPr lang="en-US"/>
           </a:p>
@@ -5083,7 +5083,7 @@
         </p:blipFill>
         <p:spPr>
           <a:xfrm>
-            <a:off x="700088" y="2807292"/>
+            <a:off x="708477" y="2807292"/>
             <a:ext cx="10691812" cy="953522"/>
           </a:xfrm>
           <a:prstGeom prst="rect">

</xml_diff>